<commit_message>
rebuilding site 2019年 6月19日 星期三 18时47分35秒 CST
</commit_message>
<xml_diff>
--- a/images/ccr_logo.pptx
+++ b/images/ccr_logo.pptx
@@ -7,6 +7,7 @@
   <p:sldIdLst>
     <p:sldId id="256" r:id="rId2"/>
     <p:sldId id="257" r:id="rId3"/>
+    <p:sldId id="258" r:id="rId4"/>
   </p:sldIdLst>
   <p:sldSz cx="12192000" cy="6858000"/>
   <p:notesSz cx="6858000" cy="9144000"/>
@@ -105,6 +106,11 @@
       </a:defRPr>
     </a:lvl9pPr>
   </p:defaultTextStyle>
+  <p:extLst>
+    <p:ext uri="{EFAFB233-063F-42B5-8137-9DF3F51BA10A}">
+      <p15:sldGuideLst xmlns:p15="http://schemas.microsoft.com/office/powerpoint/2012/main"/>
+    </p:ext>
+  </p:extLst>
 </p:presentation>
 </file>
 
@@ -239,7 +245,7 @@
           <a:p>
             <a:fld id="{05E61678-8CC3-C64C-ACFF-7ECC65F3F950}" type="datetimeFigureOut">
               <a:rPr kumimoji="1" lang="zh-CN" altLang="en-US" smtClean="0"/>
-              <a:t>2019/6/12</a:t>
+              <a:t>2019/6/13</a:t>
             </a:fld>
             <a:endParaRPr kumimoji="1" lang="zh-CN" altLang="en-US"/>
           </a:p>
@@ -409,7 +415,7 @@
           <a:p>
             <a:fld id="{05E61678-8CC3-C64C-ACFF-7ECC65F3F950}" type="datetimeFigureOut">
               <a:rPr kumimoji="1" lang="zh-CN" altLang="en-US" smtClean="0"/>
-              <a:t>2019/6/12</a:t>
+              <a:t>2019/6/13</a:t>
             </a:fld>
             <a:endParaRPr kumimoji="1" lang="zh-CN" altLang="en-US"/>
           </a:p>
@@ -589,7 +595,7 @@
           <a:p>
             <a:fld id="{05E61678-8CC3-C64C-ACFF-7ECC65F3F950}" type="datetimeFigureOut">
               <a:rPr kumimoji="1" lang="zh-CN" altLang="en-US" smtClean="0"/>
-              <a:t>2019/6/12</a:t>
+              <a:t>2019/6/13</a:t>
             </a:fld>
             <a:endParaRPr kumimoji="1" lang="zh-CN" altLang="en-US"/>
           </a:p>
@@ -759,7 +765,7 @@
           <a:p>
             <a:fld id="{05E61678-8CC3-C64C-ACFF-7ECC65F3F950}" type="datetimeFigureOut">
               <a:rPr kumimoji="1" lang="zh-CN" altLang="en-US" smtClean="0"/>
-              <a:t>2019/6/12</a:t>
+              <a:t>2019/6/13</a:t>
             </a:fld>
             <a:endParaRPr kumimoji="1" lang="zh-CN" altLang="en-US"/>
           </a:p>
@@ -1005,7 +1011,7 @@
           <a:p>
             <a:fld id="{05E61678-8CC3-C64C-ACFF-7ECC65F3F950}" type="datetimeFigureOut">
               <a:rPr kumimoji="1" lang="zh-CN" altLang="en-US" smtClean="0"/>
-              <a:t>2019/6/12</a:t>
+              <a:t>2019/6/13</a:t>
             </a:fld>
             <a:endParaRPr kumimoji="1" lang="zh-CN" altLang="en-US"/>
           </a:p>
@@ -1237,7 +1243,7 @@
           <a:p>
             <a:fld id="{05E61678-8CC3-C64C-ACFF-7ECC65F3F950}" type="datetimeFigureOut">
               <a:rPr kumimoji="1" lang="zh-CN" altLang="en-US" smtClean="0"/>
-              <a:t>2019/6/12</a:t>
+              <a:t>2019/6/13</a:t>
             </a:fld>
             <a:endParaRPr kumimoji="1" lang="zh-CN" altLang="en-US"/>
           </a:p>
@@ -1604,7 +1610,7 @@
           <a:p>
             <a:fld id="{05E61678-8CC3-C64C-ACFF-7ECC65F3F950}" type="datetimeFigureOut">
               <a:rPr kumimoji="1" lang="zh-CN" altLang="en-US" smtClean="0"/>
-              <a:t>2019/6/12</a:t>
+              <a:t>2019/6/13</a:t>
             </a:fld>
             <a:endParaRPr kumimoji="1" lang="zh-CN" altLang="en-US"/>
           </a:p>
@@ -1722,7 +1728,7 @@
           <a:p>
             <a:fld id="{05E61678-8CC3-C64C-ACFF-7ECC65F3F950}" type="datetimeFigureOut">
               <a:rPr kumimoji="1" lang="zh-CN" altLang="en-US" smtClean="0"/>
-              <a:t>2019/6/12</a:t>
+              <a:t>2019/6/13</a:t>
             </a:fld>
             <a:endParaRPr kumimoji="1" lang="zh-CN" altLang="en-US"/>
           </a:p>
@@ -1817,7 +1823,7 @@
           <a:p>
             <a:fld id="{05E61678-8CC3-C64C-ACFF-7ECC65F3F950}" type="datetimeFigureOut">
               <a:rPr kumimoji="1" lang="zh-CN" altLang="en-US" smtClean="0"/>
-              <a:t>2019/6/12</a:t>
+              <a:t>2019/6/13</a:t>
             </a:fld>
             <a:endParaRPr kumimoji="1" lang="zh-CN" altLang="en-US"/>
           </a:p>
@@ -2094,7 +2100,7 @@
           <a:p>
             <a:fld id="{05E61678-8CC3-C64C-ACFF-7ECC65F3F950}" type="datetimeFigureOut">
               <a:rPr kumimoji="1" lang="zh-CN" altLang="en-US" smtClean="0"/>
-              <a:t>2019/6/12</a:t>
+              <a:t>2019/6/13</a:t>
             </a:fld>
             <a:endParaRPr kumimoji="1" lang="zh-CN" altLang="en-US"/>
           </a:p>
@@ -2347,7 +2353,7 @@
           <a:p>
             <a:fld id="{05E61678-8CC3-C64C-ACFF-7ECC65F3F950}" type="datetimeFigureOut">
               <a:rPr kumimoji="1" lang="zh-CN" altLang="en-US" smtClean="0"/>
-              <a:t>2019/6/12</a:t>
+              <a:t>2019/6/13</a:t>
             </a:fld>
             <a:endParaRPr kumimoji="1" lang="zh-CN" altLang="en-US"/>
           </a:p>
@@ -2560,7 +2566,7 @@
           <a:p>
             <a:fld id="{05E61678-8CC3-C64C-ACFF-7ECC65F3F950}" type="datetimeFigureOut">
               <a:rPr kumimoji="1" lang="zh-CN" altLang="en-US" smtClean="0"/>
-              <a:t>2019/6/12</a:t>
+              <a:t>2019/6/13</a:t>
             </a:fld>
             <a:endParaRPr kumimoji="1" lang="zh-CN" altLang="en-US"/>
           </a:p>
@@ -3083,8 +3089,142 @@
         </p:blipFill>
         <p:spPr bwMode="auto">
           <a:xfrm rot="20732568">
-            <a:off x="1203357" y="847934"/>
-            <a:ext cx="5323115" cy="5221664"/>
+            <a:off x="1934133" y="2014802"/>
+            <a:ext cx="1297900" cy="1273164"/>
+          </a:xfrm>
+          <a:prstGeom prst="rect">
+            <a:avLst/>
+          </a:prstGeom>
+          <a:noFill/>
+          <a:ln>
+            <a:noFill/>
+          </a:ln>
+          <a:extLst>
+            <a:ext uri="{909E8E84-426E-40DD-AFC4-6F175D3DCCD1}">
+              <a14:hiddenFill xmlns:a14="http://schemas.microsoft.com/office/drawing/2010/main">
+                <a:solidFill>
+                  <a:srgbClr val="FFFFFF"/>
+                </a:solidFill>
+              </a14:hiddenFill>
+            </a:ext>
+            <a:ext uri="{91240B29-F687-4F45-9708-019B960494DF}">
+              <a14:hiddenLine xmlns:a14="http://schemas.microsoft.com/office/drawing/2010/main" w="9525">
+                <a:solidFill>
+                  <a:srgbClr val="000000"/>
+                </a:solidFill>
+                <a:miter lim="800000"/>
+                <a:headEnd/>
+                <a:tailEnd/>
+              </a14:hiddenLine>
+            </a:ext>
+          </a:extLst>
+        </p:spPr>
+      </p:pic>
+      <p:sp>
+        <p:nvSpPr>
+          <p:cNvPr id="2" name="文本框 1"/>
+          <p:cNvSpPr txBox="1"/>
+          <p:nvPr/>
+        </p:nvSpPr>
+        <p:spPr>
+          <a:xfrm>
+            <a:off x="3212756" y="2051221"/>
+            <a:ext cx="7109639" cy="1200329"/>
+          </a:xfrm>
+          <a:prstGeom prst="rect">
+            <a:avLst/>
+          </a:prstGeom>
+          <a:noFill/>
+        </p:spPr>
+        <p:txBody>
+          <a:bodyPr wrap="none" rtlCol="0">
+            <a:spAutoFit/>
+          </a:bodyPr>
+          <a:lstStyle/>
+          <a:p>
+            <a:pPr algn="ctr"/>
+            <a:r>
+              <a:rPr kumimoji="1" lang="zh-CN" altLang="en-US" sz="5400" b="1" dirty="0" smtClean="0">
+                <a:latin typeface="Heiti SC Light" charset="-122"/>
+                <a:ea typeface="Heiti SC Light" charset="-122"/>
+                <a:cs typeface="Heiti SC Light" charset="-122"/>
+              </a:rPr>
+              <a:t>计算传播学研究委员会</a:t>
+            </a:r>
+          </a:p>
+          <a:p>
+            <a:pPr algn="ctr"/>
+            <a:r>
+              <a:rPr lang="en-US" altLang="zh-CN" b="1" dirty="0">
+                <a:latin typeface="Lantinghei SC Demibold" charset="-122"/>
+                <a:ea typeface="Lantinghei SC Demibold" charset="-122"/>
+                <a:cs typeface="Lantinghei SC Demibold" charset="-122"/>
+              </a:rPr>
+              <a:t>Computational Communication Research Association</a:t>
+            </a:r>
+            <a:endParaRPr kumimoji="1" lang="zh-CN" altLang="en-US" b="1" dirty="0">
+              <a:latin typeface="Lantinghei SC Demibold" charset="-122"/>
+              <a:ea typeface="Lantinghei SC Demibold" charset="-122"/>
+              <a:cs typeface="Lantinghei SC Demibold" charset="-122"/>
+            </a:endParaRPr>
+          </a:p>
+        </p:txBody>
+      </p:sp>
+    </p:spTree>
+    <p:extLst>
+      <p:ext uri="{BB962C8B-B14F-4D97-AF65-F5344CB8AC3E}">
+        <p14:creationId xmlns:p14="http://schemas.microsoft.com/office/powerpoint/2010/main" val="909716902"/>
+      </p:ext>
+    </p:extLst>
+  </p:cSld>
+  <p:clrMapOvr>
+    <a:masterClrMapping/>
+  </p:clrMapOvr>
+</p:sld>
+</file>
+
+<file path=ppt/slides/slide3.xml><?xml version="1.0" encoding="utf-8"?>
+<p:sld xmlns:a="http://schemas.openxmlformats.org/drawingml/2006/main" xmlns:r="http://schemas.openxmlformats.org/officeDocument/2006/relationships" xmlns:p="http://schemas.openxmlformats.org/presentationml/2006/main">
+  <p:cSld>
+    <p:spTree>
+      <p:nvGrpSpPr>
+        <p:cNvPr id="1" name=""/>
+        <p:cNvGrpSpPr/>
+        <p:nvPr/>
+      </p:nvGrpSpPr>
+      <p:grpSpPr>
+        <a:xfrm>
+          <a:off x="0" y="0"/>
+          <a:ext cx="0" cy="0"/>
+          <a:chOff x="0" y="0"/>
+          <a:chExt cx="0" cy="0"/>
+        </a:xfrm>
+      </p:grpSpPr>
+      <p:pic>
+        <p:nvPicPr>
+          <p:cNvPr id="4" name="图片 18"/>
+          <p:cNvPicPr>
+            <a:picLocks noChangeAspect="1"/>
+          </p:cNvPicPr>
+          <p:nvPr/>
+        </p:nvPicPr>
+        <p:blipFill>
+          <a:blip r:embed="rId2">
+            <a:extLst>
+              <a:ext uri="{28A0092B-C50C-407E-A947-70E740481C1C}">
+                <a14:useLocalDpi xmlns:a14="http://schemas.microsoft.com/office/drawing/2010/main" val="0"/>
+              </a:ext>
+            </a:extLst>
+          </a:blip>
+          <a:srcRect/>
+          <a:stretch>
+            <a:fillRect/>
+          </a:stretch>
+        </p:blipFill>
+        <p:spPr bwMode="auto">
+          <a:xfrm rot="20732568">
+            <a:off x="2195654" y="148408"/>
+            <a:ext cx="6498853" cy="6374994"/>
           </a:xfrm>
           <a:prstGeom prst="rect">
             <a:avLst/>
@@ -3117,7 +3257,7 @@
     </p:spTree>
     <p:extLst>
       <p:ext uri="{BB962C8B-B14F-4D97-AF65-F5344CB8AC3E}">
-        <p14:creationId xmlns:p14="http://schemas.microsoft.com/office/powerpoint/2010/main" val="909716902"/>
+        <p14:creationId xmlns:p14="http://schemas.microsoft.com/office/powerpoint/2010/main" val="332699154"/>
       </p:ext>
     </p:extLst>
   </p:cSld>

</xml_diff>